<commit_message>
Moved gallery navigation buttons below the image
</commit_message>
<xml_diff>
--- a/images/Presentation1.pptx
+++ b/images/Presentation1.pptx
@@ -4865,52 +4865,6 @@
       </p:sp>
       <p:sp>
         <p:nvSpPr>
-          <p:cNvPr id="10" name="Rounded Rectangle 9">
-            <a:extLst>
-              <a:ext uri="{FF2B5EF4-FFF2-40B4-BE49-F238E27FC236}">
-                <a16:creationId xmlns:a16="http://schemas.microsoft.com/office/drawing/2014/main" id="{97D6C0FC-DFF3-E6B2-B597-C4599A26D9F9}"/>
-              </a:ext>
-            </a:extLst>
-          </p:cNvPr>
-          <p:cNvSpPr/>
-          <p:nvPr/>
-        </p:nvSpPr>
-        <p:spPr>
-          <a:xfrm>
-            <a:off x="6071013" y="120755"/>
-            <a:ext cx="2372139" cy="3233531"/>
-          </a:xfrm>
-          <a:prstGeom prst="roundRect">
-            <a:avLst/>
-          </a:prstGeom>
-        </p:spPr>
-        <p:style>
-          <a:lnRef idx="2">
-            <a:schemeClr val="accent1">
-              <a:shade val="15000"/>
-            </a:schemeClr>
-          </a:lnRef>
-          <a:fillRef idx="1">
-            <a:schemeClr val="accent1"/>
-          </a:fillRef>
-          <a:effectRef idx="0">
-            <a:schemeClr val="accent1"/>
-          </a:effectRef>
-          <a:fontRef idx="minor">
-            <a:schemeClr val="lt1"/>
-          </a:fontRef>
-        </p:style>
-        <p:txBody>
-          <a:bodyPr rtlCol="0" anchor="ctr"/>
-          <a:lstStyle/>
-          <a:p>
-            <a:pPr algn="ctr"/>
-            <a:endParaRPr lang="en-US"/>
-          </a:p>
-        </p:txBody>
-      </p:sp>
-      <p:sp>
-        <p:nvSpPr>
           <p:cNvPr id="12" name="Rounded Rectangle 11">
             <a:extLst>
               <a:ext uri="{FF2B5EF4-FFF2-40B4-BE49-F238E27FC236}">
@@ -4923,63 +4877,7 @@
         </p:nvSpPr>
         <p:spPr>
           <a:xfrm>
-            <a:off x="208416" y="114486"/>
-            <a:ext cx="2372139" cy="3233531"/>
-          </a:xfrm>
-          <a:prstGeom prst="roundRect">
-            <a:avLst/>
-          </a:prstGeom>
-          <a:solidFill>
-            <a:schemeClr val="accent1">
-              <a:alpha val="0"/>
-            </a:schemeClr>
-          </a:solidFill>
-          <a:ln w="50800">
-            <a:solidFill>
-              <a:schemeClr val="tx1"/>
-            </a:solidFill>
-          </a:ln>
-        </p:spPr>
-        <p:style>
-          <a:lnRef idx="2">
-            <a:schemeClr val="accent1">
-              <a:shade val="15000"/>
-            </a:schemeClr>
-          </a:lnRef>
-          <a:fillRef idx="1">
-            <a:schemeClr val="accent1"/>
-          </a:fillRef>
-          <a:effectRef idx="0">
-            <a:schemeClr val="accent1"/>
-          </a:effectRef>
-          <a:fontRef idx="minor">
-            <a:schemeClr val="lt1"/>
-          </a:fontRef>
-        </p:style>
-        <p:txBody>
-          <a:bodyPr rtlCol="0" anchor="ctr"/>
-          <a:lstStyle/>
-          <a:p>
-            <a:pPr algn="ctr"/>
-            <a:endParaRPr lang="en-US"/>
-          </a:p>
-        </p:txBody>
-      </p:sp>
-      <p:sp>
-        <p:nvSpPr>
-          <p:cNvPr id="14" name="Rounded Rectangle 13">
-            <a:extLst>
-              <a:ext uri="{FF2B5EF4-FFF2-40B4-BE49-F238E27FC236}">
-                <a16:creationId xmlns:a16="http://schemas.microsoft.com/office/drawing/2014/main" id="{EAB238A7-CFF7-05FC-B03B-DB69204D9061}"/>
-              </a:ext>
-            </a:extLst>
-          </p:cNvPr>
-          <p:cNvSpPr/>
-          <p:nvPr/>
-        </p:nvSpPr>
-        <p:spPr>
-          <a:xfrm>
-            <a:off x="6071013" y="-3436070"/>
+            <a:off x="216580" y="114486"/>
             <a:ext cx="2372139" cy="3233531"/>
           </a:xfrm>
           <a:prstGeom prst="roundRect">
@@ -8335,52 +8233,6 @@
       </p:sp>
       <p:sp>
         <p:nvSpPr>
-          <p:cNvPr id="10" name="Rounded Rectangle 9">
-            <a:extLst>
-              <a:ext uri="{FF2B5EF4-FFF2-40B4-BE49-F238E27FC236}">
-                <a16:creationId xmlns:a16="http://schemas.microsoft.com/office/drawing/2014/main" id="{8B5AFF6A-7C72-87A5-A7CF-5C3853D4D3DF}"/>
-              </a:ext>
-            </a:extLst>
-          </p:cNvPr>
-          <p:cNvSpPr/>
-          <p:nvPr/>
-        </p:nvSpPr>
-        <p:spPr>
-          <a:xfrm>
-            <a:off x="6071013" y="120755"/>
-            <a:ext cx="2372139" cy="3233531"/>
-          </a:xfrm>
-          <a:prstGeom prst="roundRect">
-            <a:avLst/>
-          </a:prstGeom>
-        </p:spPr>
-        <p:style>
-          <a:lnRef idx="2">
-            <a:schemeClr val="accent1">
-              <a:shade val="15000"/>
-            </a:schemeClr>
-          </a:lnRef>
-          <a:fillRef idx="1">
-            <a:schemeClr val="accent1"/>
-          </a:fillRef>
-          <a:effectRef idx="0">
-            <a:schemeClr val="accent1"/>
-          </a:effectRef>
-          <a:fontRef idx="minor">
-            <a:schemeClr val="lt1"/>
-          </a:fontRef>
-        </p:style>
-        <p:txBody>
-          <a:bodyPr rtlCol="0" anchor="ctr"/>
-          <a:lstStyle/>
-          <a:p>
-            <a:pPr algn="ctr"/>
-            <a:endParaRPr lang="en-US"/>
-          </a:p>
-        </p:txBody>
-      </p:sp>
-      <p:sp>
-        <p:nvSpPr>
           <p:cNvPr id="12" name="Rounded Rectangle 11">
             <a:extLst>
               <a:ext uri="{FF2B5EF4-FFF2-40B4-BE49-F238E27FC236}">
@@ -8394,62 +8246,6 @@
         <p:spPr>
           <a:xfrm>
             <a:off x="208416" y="114486"/>
-            <a:ext cx="2372139" cy="3233531"/>
-          </a:xfrm>
-          <a:prstGeom prst="roundRect">
-            <a:avLst/>
-          </a:prstGeom>
-          <a:solidFill>
-            <a:schemeClr val="accent1">
-              <a:alpha val="0"/>
-            </a:schemeClr>
-          </a:solidFill>
-          <a:ln w="50800">
-            <a:solidFill>
-              <a:schemeClr val="tx1"/>
-            </a:solidFill>
-          </a:ln>
-        </p:spPr>
-        <p:style>
-          <a:lnRef idx="2">
-            <a:schemeClr val="accent1">
-              <a:shade val="15000"/>
-            </a:schemeClr>
-          </a:lnRef>
-          <a:fillRef idx="1">
-            <a:schemeClr val="accent1"/>
-          </a:fillRef>
-          <a:effectRef idx="0">
-            <a:schemeClr val="accent1"/>
-          </a:effectRef>
-          <a:fontRef idx="minor">
-            <a:schemeClr val="lt1"/>
-          </a:fontRef>
-        </p:style>
-        <p:txBody>
-          <a:bodyPr rtlCol="0" anchor="ctr"/>
-          <a:lstStyle/>
-          <a:p>
-            <a:pPr algn="ctr"/>
-            <a:endParaRPr lang="en-US"/>
-          </a:p>
-        </p:txBody>
-      </p:sp>
-      <p:sp>
-        <p:nvSpPr>
-          <p:cNvPr id="14" name="Rounded Rectangle 13">
-            <a:extLst>
-              <a:ext uri="{FF2B5EF4-FFF2-40B4-BE49-F238E27FC236}">
-                <a16:creationId xmlns:a16="http://schemas.microsoft.com/office/drawing/2014/main" id="{1B4E6BF2-CB57-C205-8EE9-71B8A3733091}"/>
-              </a:ext>
-            </a:extLst>
-          </p:cNvPr>
-          <p:cNvSpPr/>
-          <p:nvPr/>
-        </p:nvSpPr>
-        <p:spPr>
-          <a:xfrm>
-            <a:off x="6071013" y="-3436070"/>
             <a:ext cx="2372139" cy="3233531"/>
           </a:xfrm>
           <a:prstGeom prst="roundRect">

</xml_diff>